<commit_message>
Updated for SQL Saturday Jacksonville 2025
</commit_message>
<xml_diff>
--- a/Microsoft Fabric/Tips and Tricks for Microsoft Fabric Data Warehouse/20250503 - SQL Saturday Jacksonville - Tips and Tricks for Microsoft Fabric Data Warehouse.pptx
+++ b/Microsoft Fabric/Tips and Tricks for Microsoft Fabric Data Warehouse/20250503 - SQL Saturday Jacksonville - Tips and Tricks for Microsoft Fabric Data Warehouse.pptx
@@ -6,7 +6,7 @@
     <p:sldMasterId id="2147483669" r:id="rId2"/>
   </p:sldMasterIdLst>
   <p:notesMasterIdLst>
-    <p:notesMasterId r:id="rId38"/>
+    <p:notesMasterId r:id="rId39"/>
   </p:notesMasterIdLst>
   <p:sldIdLst>
     <p:sldId id="256" r:id="rId3"/>
@@ -39,11 +39,12 @@
     <p:sldId id="587" r:id="rId30"/>
     <p:sldId id="588" r:id="rId31"/>
     <p:sldId id="589" r:id="rId32"/>
-    <p:sldId id="590" r:id="rId33"/>
-    <p:sldId id="591" r:id="rId34"/>
-    <p:sldId id="592" r:id="rId35"/>
-    <p:sldId id="593" r:id="rId36"/>
-    <p:sldId id="594" r:id="rId37"/>
+    <p:sldId id="595" r:id="rId33"/>
+    <p:sldId id="590" r:id="rId34"/>
+    <p:sldId id="591" r:id="rId35"/>
+    <p:sldId id="592" r:id="rId36"/>
+    <p:sldId id="593" r:id="rId37"/>
+    <p:sldId id="594" r:id="rId38"/>
   </p:sldIdLst>
   <p:sldSz cx="12192000" cy="6858000"/>
   <p:notesSz cx="6858000" cy="9144000"/>
@@ -9623,14 +9624,14 @@
           </a:ln>
           <a:extLst>
             <a:ext uri="{909E8E84-426E-40dd-AFC4-6F175D3DCCD1}">
-              <a14:hiddenFill xmlns="" xmlns:a14="http://schemas.microsoft.com/office/drawing/2010/main">
+              <a14:hiddenFill xmlns:a14="http://schemas.microsoft.com/office/drawing/2010/main" xmlns="">
                 <a:solidFill>
                   <a:srgbClr val="FFFFFF"/>
                 </a:solidFill>
               </a14:hiddenFill>
             </a:ext>
             <a:ext uri="{91240B29-F687-4f45-9708-019B960494DF}">
-              <a14:hiddenLine xmlns="" xmlns:a14="http://schemas.microsoft.com/office/drawing/2010/main" w="9525">
+              <a14:hiddenLine xmlns:a14="http://schemas.microsoft.com/office/drawing/2010/main" xmlns="" w="9525">
                 <a:solidFill>
                   <a:srgbClr val="000000"/>
                 </a:solidFill>
@@ -9840,14 +9841,14 @@
           </a:ln>
           <a:extLst>
             <a:ext uri="{909E8E84-426E-40dd-AFC4-6F175D3DCCD1}">
-              <a14:hiddenFill xmlns="" xmlns:a14="http://schemas.microsoft.com/office/drawing/2010/main">
+              <a14:hiddenFill xmlns:a14="http://schemas.microsoft.com/office/drawing/2010/main" xmlns="">
                 <a:solidFill>
                   <a:srgbClr val="FFFFFF"/>
                 </a:solidFill>
               </a14:hiddenFill>
             </a:ext>
             <a:ext uri="{91240B29-F687-4f45-9708-019B960494DF}">
-              <a14:hiddenLine xmlns="" xmlns:a14="http://schemas.microsoft.com/office/drawing/2010/main" w="9525">
+              <a14:hiddenLine xmlns:a14="http://schemas.microsoft.com/office/drawing/2010/main" xmlns="" w="9525">
                 <a:solidFill>
                   <a:srgbClr val="000000"/>
                 </a:solidFill>
@@ -9919,14 +9920,14 @@
           </a:ln>
           <a:extLst>
             <a:ext uri="{909E8E84-426E-40dd-AFC4-6F175D3DCCD1}">
-              <a14:hiddenFill xmlns="" xmlns:a14="http://schemas.microsoft.com/office/drawing/2010/main">
+              <a14:hiddenFill xmlns:a14="http://schemas.microsoft.com/office/drawing/2010/main" xmlns="">
                 <a:solidFill>
                   <a:srgbClr val="FFFFFF"/>
                 </a:solidFill>
               </a14:hiddenFill>
             </a:ext>
             <a:ext uri="{91240B29-F687-4f45-9708-019B960494DF}">
-              <a14:hiddenLine xmlns="" xmlns:a14="http://schemas.microsoft.com/office/drawing/2010/main" w="9525">
+              <a14:hiddenLine xmlns:a14="http://schemas.microsoft.com/office/drawing/2010/main" xmlns="" w="9525">
                 <a:solidFill>
                   <a:srgbClr val="000000"/>
                 </a:solidFill>
@@ -10139,14 +10140,14 @@
           </a:ln>
           <a:extLst>
             <a:ext uri="{909E8E84-426E-40dd-AFC4-6F175D3DCCD1}">
-              <a14:hiddenFill xmlns="" xmlns:a14="http://schemas.microsoft.com/office/drawing/2010/main">
+              <a14:hiddenFill xmlns:a14="http://schemas.microsoft.com/office/drawing/2010/main" xmlns="">
                 <a:solidFill>
                   <a:srgbClr val="FFFFFF"/>
                 </a:solidFill>
               </a14:hiddenFill>
             </a:ext>
             <a:ext uri="{91240B29-F687-4f45-9708-019B960494DF}">
-              <a14:hiddenLine xmlns="" xmlns:a14="http://schemas.microsoft.com/office/drawing/2010/main" w="9525">
+              <a14:hiddenLine xmlns:a14="http://schemas.microsoft.com/office/drawing/2010/main" xmlns="" w="9525">
                 <a:solidFill>
                   <a:srgbClr val="000000"/>
                 </a:solidFill>
@@ -10445,14 +10446,14 @@
           </a:ln>
           <a:extLst>
             <a:ext uri="{909E8E84-426E-40dd-AFC4-6F175D3DCCD1}">
-              <a14:hiddenFill xmlns="" xmlns:a14="http://schemas.microsoft.com/office/drawing/2010/main">
+              <a14:hiddenFill xmlns:a14="http://schemas.microsoft.com/office/drawing/2010/main" xmlns="">
                 <a:solidFill>
                   <a:srgbClr val="FFFFFF"/>
                 </a:solidFill>
               </a14:hiddenFill>
             </a:ext>
             <a:ext uri="{91240B29-F687-4f45-9708-019B960494DF}">
-              <a14:hiddenLine xmlns="" xmlns:a14="http://schemas.microsoft.com/office/drawing/2010/main" w="9525">
+              <a14:hiddenLine xmlns:a14="http://schemas.microsoft.com/office/drawing/2010/main" xmlns="" w="9525">
                 <a:solidFill>
                   <a:srgbClr val="000000"/>
                 </a:solidFill>
@@ -10665,14 +10666,14 @@
           </a:ln>
           <a:extLst>
             <a:ext uri="{909E8E84-426E-40dd-AFC4-6F175D3DCCD1}">
-              <a14:hiddenFill xmlns="" xmlns:a14="http://schemas.microsoft.com/office/drawing/2010/main">
+              <a14:hiddenFill xmlns:a14="http://schemas.microsoft.com/office/drawing/2010/main" xmlns="">
                 <a:solidFill>
                   <a:srgbClr val="FFFFFF"/>
                 </a:solidFill>
               </a14:hiddenFill>
             </a:ext>
             <a:ext uri="{91240B29-F687-4f45-9708-019B960494DF}">
-              <a14:hiddenLine xmlns="" xmlns:a14="http://schemas.microsoft.com/office/drawing/2010/main" w="9525">
+              <a14:hiddenLine xmlns:a14="http://schemas.microsoft.com/office/drawing/2010/main" xmlns="" w="9525">
                 <a:solidFill>
                   <a:srgbClr val="000000"/>
                 </a:solidFill>
@@ -11575,14 +11576,14 @@
           </a:ln>
           <a:extLst>
             <a:ext uri="{909E8E84-426E-40dd-AFC4-6F175D3DCCD1}">
-              <a14:hiddenFill xmlns="" xmlns:a14="http://schemas.microsoft.com/office/drawing/2010/main">
+              <a14:hiddenFill xmlns:a14="http://schemas.microsoft.com/office/drawing/2010/main" xmlns="">
                 <a:solidFill>
                   <a:srgbClr val="FFFFFF"/>
                 </a:solidFill>
               </a14:hiddenFill>
             </a:ext>
             <a:ext uri="{91240B29-F687-4f45-9708-019B960494DF}">
-              <a14:hiddenLine xmlns="" xmlns:a14="http://schemas.microsoft.com/office/drawing/2010/main" w="9525">
+              <a14:hiddenLine xmlns:a14="http://schemas.microsoft.com/office/drawing/2010/main" xmlns="" w="9525">
                 <a:solidFill>
                   <a:srgbClr val="000000"/>
                 </a:solidFill>
@@ -11925,14 +11926,14 @@
           </a:ln>
           <a:extLst>
             <a:ext uri="{909E8E84-426E-40dd-AFC4-6F175D3DCCD1}">
-              <a14:hiddenFill xmlns="" xmlns:a14="http://schemas.microsoft.com/office/drawing/2010/main">
+              <a14:hiddenFill xmlns:a14="http://schemas.microsoft.com/office/drawing/2010/main" xmlns="">
                 <a:solidFill>
                   <a:srgbClr val="FFFFFF"/>
                 </a:solidFill>
               </a14:hiddenFill>
             </a:ext>
             <a:ext uri="{91240B29-F687-4f45-9708-019B960494DF}">
-              <a14:hiddenLine xmlns="" xmlns:a14="http://schemas.microsoft.com/office/drawing/2010/main" w="9525">
+              <a14:hiddenLine xmlns:a14="http://schemas.microsoft.com/office/drawing/2010/main" xmlns="" w="9525">
                 <a:solidFill>
                   <a:srgbClr val="000000"/>
                 </a:solidFill>
@@ -12155,14 +12156,14 @@
           </a:ln>
           <a:extLst>
             <a:ext uri="{909E8E84-426E-40dd-AFC4-6F175D3DCCD1}">
-              <a14:hiddenFill xmlns="" xmlns:a14="http://schemas.microsoft.com/office/drawing/2010/main">
+              <a14:hiddenFill xmlns:a14="http://schemas.microsoft.com/office/drawing/2010/main" xmlns="">
                 <a:solidFill>
                   <a:srgbClr val="FFFFFF"/>
                 </a:solidFill>
               </a14:hiddenFill>
             </a:ext>
             <a:ext uri="{91240B29-F687-4f45-9708-019B960494DF}">
-              <a14:hiddenLine xmlns="" xmlns:a14="http://schemas.microsoft.com/office/drawing/2010/main" w="9525">
+              <a14:hiddenLine xmlns:a14="http://schemas.microsoft.com/office/drawing/2010/main" xmlns="" w="9525">
                 <a:solidFill>
                   <a:srgbClr val="000000"/>
                 </a:solidFill>
@@ -12385,14 +12386,14 @@
           </a:ln>
           <a:extLst>
             <a:ext uri="{909E8E84-426E-40dd-AFC4-6F175D3DCCD1}">
-              <a14:hiddenFill xmlns="" xmlns:a14="http://schemas.microsoft.com/office/drawing/2010/main">
+              <a14:hiddenFill xmlns:a14="http://schemas.microsoft.com/office/drawing/2010/main" xmlns="">
                 <a:solidFill>
                   <a:srgbClr val="FFFFFF"/>
                 </a:solidFill>
               </a14:hiddenFill>
             </a:ext>
             <a:ext uri="{91240B29-F687-4f45-9708-019B960494DF}">
-              <a14:hiddenLine xmlns="" xmlns:a14="http://schemas.microsoft.com/office/drawing/2010/main" w="9525">
+              <a14:hiddenLine xmlns:a14="http://schemas.microsoft.com/office/drawing/2010/main" xmlns="" w="9525">
                 <a:solidFill>
                   <a:srgbClr val="000000"/>
                 </a:solidFill>
@@ -12617,14 +12618,14 @@
           </a:ln>
           <a:extLst>
             <a:ext uri="{909E8E84-426E-40dd-AFC4-6F175D3DCCD1}">
-              <a14:hiddenFill xmlns="" xmlns:a14="http://schemas.microsoft.com/office/drawing/2010/main">
+              <a14:hiddenFill xmlns:a14="http://schemas.microsoft.com/office/drawing/2010/main" xmlns="">
                 <a:solidFill>
                   <a:srgbClr val="FFFFFF"/>
                 </a:solidFill>
               </a14:hiddenFill>
             </a:ext>
             <a:ext uri="{91240B29-F687-4f45-9708-019B960494DF}">
-              <a14:hiddenLine xmlns="" xmlns:a14="http://schemas.microsoft.com/office/drawing/2010/main" w="9525">
+              <a14:hiddenLine xmlns:a14="http://schemas.microsoft.com/office/drawing/2010/main" xmlns="" w="9525">
                 <a:solidFill>
                   <a:srgbClr val="000000"/>
                 </a:solidFill>
@@ -16447,14 +16448,14 @@
           </a:ln>
           <a:extLst>
             <a:ext uri="{909E8E84-426E-40dd-AFC4-6F175D3DCCD1}">
-              <a14:hiddenFill xmlns="" xmlns:a14="http://schemas.microsoft.com/office/drawing/2010/main">
+              <a14:hiddenFill xmlns:a14="http://schemas.microsoft.com/office/drawing/2010/main" xmlns="">
                 <a:solidFill>
                   <a:srgbClr val="FFFFFF"/>
                 </a:solidFill>
               </a14:hiddenFill>
             </a:ext>
             <a:ext uri="{91240B29-F687-4f45-9708-019B960494DF}">
-              <a14:hiddenLine xmlns="" xmlns:a14="http://schemas.microsoft.com/office/drawing/2010/main" w="9525">
+              <a14:hiddenLine xmlns:a14="http://schemas.microsoft.com/office/drawing/2010/main" xmlns="" w="9525">
                 <a:solidFill>
                   <a:srgbClr val="000000"/>
                 </a:solidFill>
@@ -16507,14 +16508,14 @@
           </a:ln>
           <a:extLst>
             <a:ext uri="{909E8E84-426E-40dd-AFC4-6F175D3DCCD1}">
-              <a14:hiddenFill xmlns="" xmlns:a14="http://schemas.microsoft.com/office/drawing/2010/main">
+              <a14:hiddenFill xmlns:a14="http://schemas.microsoft.com/office/drawing/2010/main" xmlns="">
                 <a:solidFill>
                   <a:srgbClr val="FFFFFF"/>
                 </a:solidFill>
               </a14:hiddenFill>
             </a:ext>
             <a:ext uri="{91240B29-F687-4f45-9708-019B960494DF}">
-              <a14:hiddenLine xmlns="" xmlns:a14="http://schemas.microsoft.com/office/drawing/2010/main" w="9525">
+              <a14:hiddenLine xmlns:a14="http://schemas.microsoft.com/office/drawing/2010/main" xmlns="" w="9525">
                 <a:solidFill>
                   <a:srgbClr val="000000"/>
                 </a:solidFill>
@@ -21069,7 +21070,13 @@
   <p:cSld>
     <p:spTree>
       <p:nvGrpSpPr>
-        <p:cNvPr id="1" name=""/>
+        <p:cNvPr id="1" name="">
+          <a:extLst>
+            <a:ext uri="{FF2B5EF4-FFF2-40B4-BE49-F238E27FC236}">
+              <a16:creationId xmlns:a16="http://schemas.microsoft.com/office/drawing/2014/main" id="{299CA2C3-0A11-DBB9-583D-14D700294724}"/>
+            </a:ext>
+          </a:extLst>
+        </p:cNvPr>
         <p:cNvGrpSpPr/>
         <p:nvPr/>
       </p:nvGrpSpPr>
@@ -21086,7 +21093,7 @@
           <p:cNvPr id="2" name="Title 1">
             <a:extLst>
               <a:ext uri="{FF2B5EF4-FFF2-40B4-BE49-F238E27FC236}">
-                <a16:creationId xmlns:a16="http://schemas.microsoft.com/office/drawing/2014/main" id="{22FC0997-3CB9-4AC0-9A06-C07B8B01E6ED}"/>
+                <a16:creationId xmlns:a16="http://schemas.microsoft.com/office/drawing/2014/main" id="{685C784B-CD27-ED33-238F-C357D788BE47}"/>
               </a:ext>
             </a:extLst>
           </p:cNvPr>
@@ -21114,7 +21121,7 @@
                   <a:schemeClr val="accent2"/>
                 </a:solidFill>
               </a:rPr>
-              <a:t>T-SQL Limitation #2</a:t>
+              <a:t>T-SQL Limitation #1 Fixed!</a:t>
             </a:r>
           </a:p>
         </p:txBody>
@@ -21124,7 +21131,7 @@
           <p:cNvPr id="3" name="Subtitle 2">
             <a:extLst>
               <a:ext uri="{FF2B5EF4-FFF2-40B4-BE49-F238E27FC236}">
-                <a16:creationId xmlns:a16="http://schemas.microsoft.com/office/drawing/2014/main" id="{45C867A6-A7E8-4D82-9D66-A68CDB8EFA38}"/>
+                <a16:creationId xmlns:a16="http://schemas.microsoft.com/office/drawing/2014/main" id="{4399520E-A67D-DBCC-D816-B2805838AA73}"/>
               </a:ext>
             </a:extLst>
           </p:cNvPr>
@@ -21143,7 +21150,7 @@
         </p:spPr>
         <p:txBody>
           <a:bodyPr>
-            <a:normAutofit/>
+            <a:noAutofit/>
           </a:bodyPr>
           <a:lstStyle/>
           <a:p>
@@ -21157,7 +21164,7 @@
                   </a:schemeClr>
                 </a:solidFill>
               </a:rPr>
-              <a:t>No INSERT INTO… EXEC from a stored procedure</a:t>
+              <a:t>Two types of session-scoped temporary tables are available as of April 22nd</a:t>
             </a:r>
           </a:p>
           <a:p>
@@ -21182,7 +21189,7 @@
                   </a:schemeClr>
                 </a:solidFill>
               </a:rPr>
-              <a:t>Re-locate transformation logic</a:t>
+              <a:t>Globally-scoped temporary tables are not available</a:t>
             </a:r>
           </a:p>
           <a:p>
@@ -21207,8 +21214,27 @@
                   </a:schemeClr>
                 </a:solidFill>
               </a:rPr>
-              <a:t>Separating complex business logic from “plumbing”</a:t>
-            </a:r>
+              <a:t>Non-distributed temp tables work like classic T-SQL temp tables; Distributed ones declared </a:t>
+            </a:r>
+            <a:r>
+              <a:rPr lang="en-US" sz="2400">
+                <a:solidFill>
+                  <a:schemeClr val="tx1">
+                    <a:lumMod val="65000"/>
+                    <a:lumOff val="35000"/>
+                  </a:schemeClr>
+                </a:solidFill>
+              </a:rPr>
+              <a:t>as round-robin</a:t>
+            </a:r>
+            <a:endParaRPr lang="en-US" sz="2400" dirty="0">
+              <a:solidFill>
+                <a:schemeClr val="tx1">
+                  <a:lumMod val="65000"/>
+                  <a:lumOff val="35000"/>
+                </a:schemeClr>
+              </a:solidFill>
+            </a:endParaRPr>
           </a:p>
           <a:p>
             <a:pPr algn="l"/>
@@ -21232,32 +21258,7 @@
                   </a:schemeClr>
                 </a:solidFill>
               </a:rPr>
-              <a:t>Workaround – Use physical “temp” tables</a:t>
-            </a:r>
-          </a:p>
-          <a:p>
-            <a:pPr algn="l"/>
-            <a:endParaRPr lang="en-US" sz="1200" dirty="0">
-              <a:solidFill>
-                <a:schemeClr val="tx1">
-                  <a:lumMod val="65000"/>
-                  <a:lumOff val="35000"/>
-                </a:schemeClr>
-              </a:solidFill>
-            </a:endParaRPr>
-          </a:p>
-          <a:p>
-            <a:pPr algn="l"/>
-            <a:r>
-              <a:rPr lang="en-US" sz="2400" dirty="0">
-                <a:solidFill>
-                  <a:schemeClr val="tx1">
-                    <a:lumMod val="65000"/>
-                    <a:lumOff val="35000"/>
-                  </a:schemeClr>
-                </a:solidFill>
-              </a:rPr>
-              <a:t>But watch out for – Concurrent updates</a:t>
+              <a:t>https://blog.fabric.microsoft.com/en-US/blog/announcing-the-general-availability-of-session-scoped-distributed-temp-tables-in-fabric-data-warehouse/</a:t>
             </a:r>
           </a:p>
         </p:txBody>
@@ -21265,7 +21266,7 @@
     </p:spTree>
     <p:extLst>
       <p:ext uri="{BB962C8B-B14F-4D97-AF65-F5344CB8AC3E}">
-        <p14:creationId xmlns:p14="http://schemas.microsoft.com/office/powerpoint/2010/main" val="94531727"/>
+        <p14:creationId xmlns:p14="http://schemas.microsoft.com/office/powerpoint/2010/main" val="2266139534"/>
       </p:ext>
     </p:extLst>
   </p:cSld>
@@ -21325,7 +21326,7 @@
                   <a:schemeClr val="accent2"/>
                 </a:solidFill>
               </a:rPr>
-              <a:t>T-SQL Limitation #3</a:t>
+              <a:t>T-SQL Limitation #2</a:t>
             </a:r>
           </a:p>
         </p:txBody>
@@ -21368,7 +21369,7 @@
                   </a:schemeClr>
                 </a:solidFill>
               </a:rPr>
-              <a:t>No MERGE statement</a:t>
+              <a:t>No INSERT INTO… EXEC from a stored procedure</a:t>
             </a:r>
           </a:p>
           <a:p>
@@ -21393,19 +21394,7 @@
                   </a:schemeClr>
                 </a:solidFill>
               </a:rPr>
-              <a:t>Is this really a limitation?  </a:t>
-            </a:r>
-            <a:r>
-              <a:rPr lang="en-US" sz="2400" dirty="0">
-                <a:solidFill>
-                  <a:schemeClr val="tx1">
-                    <a:lumMod val="65000"/>
-                    <a:lumOff val="35000"/>
-                  </a:schemeClr>
-                </a:solidFill>
-                <a:sym typeface="Wingdings" panose="05000000000000000000" pitchFamily="2" charset="2"/>
-              </a:rPr>
-              <a:t></a:t>
+              <a:t>Re-locate transformation logic</a:t>
             </a:r>
           </a:p>
           <a:p>
@@ -21430,7 +21419,7 @@
                   </a:schemeClr>
                 </a:solidFill>
               </a:rPr>
-              <a:t>Workaround - Separate INSERT and UPDATE statements</a:t>
+              <a:t>Separating complex business logic from “plumbing”</a:t>
             </a:r>
           </a:p>
           <a:p>
@@ -21455,7 +21444,32 @@
                   </a:schemeClr>
                 </a:solidFill>
               </a:rPr>
-              <a:t>But watch out for – Handling transactions</a:t>
+              <a:t>Workaround – Use physical “temp” tables</a:t>
+            </a:r>
+          </a:p>
+          <a:p>
+            <a:pPr algn="l"/>
+            <a:endParaRPr lang="en-US" sz="1200" dirty="0">
+              <a:solidFill>
+                <a:schemeClr val="tx1">
+                  <a:lumMod val="65000"/>
+                  <a:lumOff val="35000"/>
+                </a:schemeClr>
+              </a:solidFill>
+            </a:endParaRPr>
+          </a:p>
+          <a:p>
+            <a:pPr algn="l"/>
+            <a:r>
+              <a:rPr lang="en-US" sz="2400" dirty="0">
+                <a:solidFill>
+                  <a:schemeClr val="tx1">
+                    <a:lumMod val="65000"/>
+                    <a:lumOff val="35000"/>
+                  </a:schemeClr>
+                </a:solidFill>
+              </a:rPr>
+              <a:t>But watch out for – Concurrent updates</a:t>
             </a:r>
           </a:p>
         </p:txBody>
@@ -21463,7 +21477,7 @@
     </p:spTree>
     <p:extLst>
       <p:ext uri="{BB962C8B-B14F-4D97-AF65-F5344CB8AC3E}">
-        <p14:creationId xmlns:p14="http://schemas.microsoft.com/office/powerpoint/2010/main" val="2990947372"/>
+        <p14:creationId xmlns:p14="http://schemas.microsoft.com/office/powerpoint/2010/main" val="94531727"/>
       </p:ext>
     </p:extLst>
   </p:cSld>
@@ -21523,7 +21537,7 @@
                   <a:schemeClr val="accent2"/>
                 </a:solidFill>
               </a:rPr>
-              <a:t>T-SQL Limitation #4</a:t>
+              <a:t>T-SQL Limitation #3</a:t>
             </a:r>
           </a:p>
         </p:txBody>
@@ -21566,7 +21580,7 @@
                   </a:schemeClr>
                 </a:solidFill>
               </a:rPr>
-              <a:t>No IDENTITY() columns</a:t>
+              <a:t>No MERGE statement</a:t>
             </a:r>
           </a:p>
           <a:p>
@@ -21591,7 +21605,19 @@
                   </a:schemeClr>
                 </a:solidFill>
               </a:rPr>
-              <a:t>Workaround - Use ROW_NUMBER() function plus a seed</a:t>
+              <a:t>Is this really a limitation?  </a:t>
+            </a:r>
+            <a:r>
+              <a:rPr lang="en-US" sz="2400" dirty="0">
+                <a:solidFill>
+                  <a:schemeClr val="tx1">
+                    <a:lumMod val="65000"/>
+                    <a:lumOff val="35000"/>
+                  </a:schemeClr>
+                </a:solidFill>
+                <a:sym typeface="Wingdings" panose="05000000000000000000" pitchFamily="2" charset="2"/>
+              </a:rPr>
+              <a:t></a:t>
             </a:r>
           </a:p>
           <a:p>
@@ -21616,7 +21642,32 @@
                   </a:schemeClr>
                 </a:solidFill>
               </a:rPr>
-              <a:t>But watch out for – Concurrent inserts</a:t>
+              <a:t>Workaround - Separate INSERT and UPDATE statements</a:t>
+            </a:r>
+          </a:p>
+          <a:p>
+            <a:pPr algn="l"/>
+            <a:endParaRPr lang="en-US" sz="1200" dirty="0">
+              <a:solidFill>
+                <a:schemeClr val="tx1">
+                  <a:lumMod val="65000"/>
+                  <a:lumOff val="35000"/>
+                </a:schemeClr>
+              </a:solidFill>
+            </a:endParaRPr>
+          </a:p>
+          <a:p>
+            <a:pPr algn="l"/>
+            <a:r>
+              <a:rPr lang="en-US" sz="2400" dirty="0">
+                <a:solidFill>
+                  <a:schemeClr val="tx1">
+                    <a:lumMod val="65000"/>
+                    <a:lumOff val="35000"/>
+                  </a:schemeClr>
+                </a:solidFill>
+              </a:rPr>
+              <a:t>But watch out for – Handling transactions</a:t>
             </a:r>
           </a:p>
         </p:txBody>
@@ -21624,7 +21675,7 @@
     </p:spTree>
     <p:extLst>
       <p:ext uri="{BB962C8B-B14F-4D97-AF65-F5344CB8AC3E}">
-        <p14:creationId xmlns:p14="http://schemas.microsoft.com/office/powerpoint/2010/main" val="1513189759"/>
+        <p14:creationId xmlns:p14="http://schemas.microsoft.com/office/powerpoint/2010/main" val="2990947372"/>
       </p:ext>
     </p:extLst>
   </p:cSld>
@@ -21684,6 +21735,167 @@
                   <a:schemeClr val="accent2"/>
                 </a:solidFill>
               </a:rPr>
+              <a:t>T-SQL Limitation #4</a:t>
+            </a:r>
+          </a:p>
+        </p:txBody>
+      </p:sp>
+      <p:sp>
+        <p:nvSpPr>
+          <p:cNvPr id="3" name="Subtitle 2">
+            <a:extLst>
+              <a:ext uri="{FF2B5EF4-FFF2-40B4-BE49-F238E27FC236}">
+                <a16:creationId xmlns:a16="http://schemas.microsoft.com/office/drawing/2014/main" id="{45C867A6-A7E8-4D82-9D66-A68CDB8EFA38}"/>
+              </a:ext>
+            </a:extLst>
+          </p:cNvPr>
+          <p:cNvSpPr>
+            <a:spLocks noGrp="1"/>
+          </p:cNvSpPr>
+          <p:nvPr>
+            <p:ph type="subTitle" idx="1"/>
+          </p:nvPr>
+        </p:nvSpPr>
+        <p:spPr>
+          <a:xfrm>
+            <a:off x="1507067" y="1661021"/>
+            <a:ext cx="7766936" cy="4530054"/>
+          </a:xfrm>
+        </p:spPr>
+        <p:txBody>
+          <a:bodyPr>
+            <a:normAutofit/>
+          </a:bodyPr>
+          <a:lstStyle/>
+          <a:p>
+            <a:pPr algn="l"/>
+            <a:r>
+              <a:rPr lang="en-US" sz="2400" dirty="0">
+                <a:solidFill>
+                  <a:schemeClr val="tx1">
+                    <a:lumMod val="65000"/>
+                    <a:lumOff val="35000"/>
+                  </a:schemeClr>
+                </a:solidFill>
+              </a:rPr>
+              <a:t>No IDENTITY() columns</a:t>
+            </a:r>
+          </a:p>
+          <a:p>
+            <a:pPr algn="l"/>
+            <a:endParaRPr lang="en-US" sz="1200" dirty="0">
+              <a:solidFill>
+                <a:schemeClr val="tx1">
+                  <a:lumMod val="65000"/>
+                  <a:lumOff val="35000"/>
+                </a:schemeClr>
+              </a:solidFill>
+            </a:endParaRPr>
+          </a:p>
+          <a:p>
+            <a:pPr algn="l"/>
+            <a:r>
+              <a:rPr lang="en-US" sz="2400" dirty="0">
+                <a:solidFill>
+                  <a:schemeClr val="tx1">
+                    <a:lumMod val="65000"/>
+                    <a:lumOff val="35000"/>
+                  </a:schemeClr>
+                </a:solidFill>
+              </a:rPr>
+              <a:t>Workaround - Use ROW_NUMBER() function plus a seed</a:t>
+            </a:r>
+          </a:p>
+          <a:p>
+            <a:pPr algn="l"/>
+            <a:endParaRPr lang="en-US" sz="1200" dirty="0">
+              <a:solidFill>
+                <a:schemeClr val="tx1">
+                  <a:lumMod val="65000"/>
+                  <a:lumOff val="35000"/>
+                </a:schemeClr>
+              </a:solidFill>
+            </a:endParaRPr>
+          </a:p>
+          <a:p>
+            <a:pPr algn="l"/>
+            <a:r>
+              <a:rPr lang="en-US" sz="2400" dirty="0">
+                <a:solidFill>
+                  <a:schemeClr val="tx1">
+                    <a:lumMod val="65000"/>
+                    <a:lumOff val="35000"/>
+                  </a:schemeClr>
+                </a:solidFill>
+              </a:rPr>
+              <a:t>But watch out for – Concurrent inserts</a:t>
+            </a:r>
+          </a:p>
+        </p:txBody>
+      </p:sp>
+    </p:spTree>
+    <p:extLst>
+      <p:ext uri="{BB962C8B-B14F-4D97-AF65-F5344CB8AC3E}">
+        <p14:creationId xmlns:p14="http://schemas.microsoft.com/office/powerpoint/2010/main" val="1513189759"/>
+      </p:ext>
+    </p:extLst>
+  </p:cSld>
+  <p:clrMapOvr>
+    <a:masterClrMapping/>
+  </p:clrMapOvr>
+</p:sld>
+</file>
+
+<file path=ppt/slides/slide35.xml><?xml version="1.0" encoding="utf-8"?>
+<p:sld xmlns:a="http://schemas.openxmlformats.org/drawingml/2006/main" xmlns:r="http://schemas.openxmlformats.org/officeDocument/2006/relationships" xmlns:p="http://schemas.openxmlformats.org/presentationml/2006/main">
+  <p:cSld>
+    <p:spTree>
+      <p:nvGrpSpPr>
+        <p:cNvPr id="1" name=""/>
+        <p:cNvGrpSpPr/>
+        <p:nvPr/>
+      </p:nvGrpSpPr>
+      <p:grpSpPr>
+        <a:xfrm>
+          <a:off x="0" y="0"/>
+          <a:ext cx="0" cy="0"/>
+          <a:chOff x="0" y="0"/>
+          <a:chExt cx="0" cy="0"/>
+        </a:xfrm>
+      </p:grpSpPr>
+      <p:sp>
+        <p:nvSpPr>
+          <p:cNvPr id="2" name="Title 1">
+            <a:extLst>
+              <a:ext uri="{FF2B5EF4-FFF2-40B4-BE49-F238E27FC236}">
+                <a16:creationId xmlns:a16="http://schemas.microsoft.com/office/drawing/2014/main" id="{22FC0997-3CB9-4AC0-9A06-C07B8B01E6ED}"/>
+              </a:ext>
+            </a:extLst>
+          </p:cNvPr>
+          <p:cNvSpPr>
+            <a:spLocks noGrp="1"/>
+          </p:cNvSpPr>
+          <p:nvPr>
+            <p:ph type="ctrTitle"/>
+          </p:nvPr>
+        </p:nvSpPr>
+        <p:spPr>
+          <a:xfrm>
+            <a:off x="1342238" y="570452"/>
+            <a:ext cx="8019875" cy="855676"/>
+          </a:xfrm>
+        </p:spPr>
+        <p:txBody>
+          <a:bodyPr/>
+          <a:lstStyle/>
+          <a:p>
+            <a:pPr algn="ctr"/>
+            <a:r>
+              <a:rPr lang="en-US" sz="4800" dirty="0">
+                <a:solidFill>
+                  <a:schemeClr val="accent2"/>
+                </a:solidFill>
+              </a:rPr>
               <a:t>7. Leverage the Lakehouse</a:t>
             </a:r>
           </a:p>
@@ -21823,7 +22035,7 @@
 </p:sld>
 </file>
 
-<file path=ppt/slides/slide35.xml><?xml version="1.0" encoding="utf-8"?>
+<file path=ppt/slides/slide36.xml><?xml version="1.0" encoding="utf-8"?>
 <p:sld xmlns:a="http://schemas.openxmlformats.org/drawingml/2006/main" xmlns:r="http://schemas.openxmlformats.org/officeDocument/2006/relationships" xmlns:p="http://schemas.openxmlformats.org/presentationml/2006/main">
   <p:cSld>
     <p:spTree>
@@ -23651,14 +23863,14 @@
           </a:ln>
           <a:extLst>
             <a:ext uri="{909E8E84-426E-40dd-AFC4-6F175D3DCCD1}">
-              <a14:hiddenFill xmlns:a14="http://schemas.microsoft.com/office/drawing/2010/main" xmlns="">
+              <a14:hiddenFill xmlns="" xmlns:a14="http://schemas.microsoft.com/office/drawing/2010/main">
                 <a:solidFill>
                   <a:srgbClr val="FFFFFF"/>
                 </a:solidFill>
               </a14:hiddenFill>
             </a:ext>
             <a:ext uri="{91240B29-F687-4f45-9708-019B960494DF}">
-              <a14:hiddenLine xmlns:a14="http://schemas.microsoft.com/office/drawing/2010/main" xmlns="" w="9525">
+              <a14:hiddenLine xmlns="" xmlns:a14="http://schemas.microsoft.com/office/drawing/2010/main" w="9525">
                 <a:solidFill>
                   <a:srgbClr val="000000"/>
                 </a:solidFill>

</xml_diff>